<commit_message>
Adding activity 1.3 again with an edit
</commit_message>
<xml_diff>
--- a/1.3-Activity-PSS_ More Git _ Environment Variables.pptx
+++ b/1.3-Activity-PSS_ More Git _ Environment Variables.pptx
@@ -9112,6 +9112,50 @@
           </a:graphicData>
         </a:graphic>
       </p:graphicFrame>
+      <p:sp>
+        <p:nvSpPr>
+          <p:cNvPr id="2" name="TextBox 1">
+            <a:extLst>
+              <a:ext uri="{FF2B5EF4-FFF2-40B4-BE49-F238E27FC236}">
+                <a16:creationId xmlns:a16="http://schemas.microsoft.com/office/drawing/2014/main" id="{04F5D3FE-D4B5-4629-BC5B-FA18D8C515FF}"/>
+              </a:ext>
+            </a:extLst>
+          </p:cNvPr>
+          <p:cNvSpPr txBox="1"/>
+          <p:nvPr/>
+        </p:nvSpPr>
+        <p:spPr>
+          <a:xfrm>
+            <a:off x="3112034" y="125175"/>
+            <a:ext cx="906191" cy="307777"/>
+          </a:xfrm>
+          <a:prstGeom prst="rect">
+            <a:avLst/>
+          </a:prstGeom>
+          <a:noFill/>
+        </p:spPr>
+        <p:txBody>
+          <a:bodyPr wrap="square" rtlCol="0">
+            <a:spAutoFit/>
+          </a:bodyPr>
+          <a:lstStyle/>
+          <a:p>
+            <a:r>
+              <a:rPr lang="en-US" dirty="0">
+                <a:highlight>
+                  <a:srgbClr val="C0C0C0"/>
+                </a:highlight>
+              </a:rPr>
+              <a:t>Arya </a:t>
+            </a:r>
+            <a:endParaRPr lang="en-AE" dirty="0">
+              <a:highlight>
+                <a:srgbClr val="C0C0C0"/>
+              </a:highlight>
+            </a:endParaRPr>
+          </a:p>
+        </p:txBody>
+      </p:sp>
     </p:spTree>
   </p:cSld>
   <p:clrMapOvr>
@@ -9614,6 +9658,46 @@
           </a:graphicData>
         </a:graphic>
       </p:graphicFrame>
+      <p:sp>
+        <p:nvSpPr>
+          <p:cNvPr id="7" name="TextBox 6">
+            <a:extLst>
+              <a:ext uri="{FF2B5EF4-FFF2-40B4-BE49-F238E27FC236}">
+                <a16:creationId xmlns:a16="http://schemas.microsoft.com/office/drawing/2014/main" id="{21FD3262-3FC1-4FB0-9DA5-F5FD065FD214}"/>
+              </a:ext>
+            </a:extLst>
+          </p:cNvPr>
+          <p:cNvSpPr txBox="1"/>
+          <p:nvPr/>
+        </p:nvSpPr>
+        <p:spPr>
+          <a:xfrm>
+            <a:off x="8237284" y="119573"/>
+            <a:ext cx="564810" cy="307777"/>
+          </a:xfrm>
+          <a:prstGeom prst="rect">
+            <a:avLst/>
+          </a:prstGeom>
+          <a:noFill/>
+        </p:spPr>
+        <p:txBody>
+          <a:bodyPr wrap="square">
+            <a:spAutoFit/>
+          </a:bodyPr>
+          <a:lstStyle/>
+          <a:p>
+            <a:r>
+              <a:rPr lang="en-US" dirty="0">
+                <a:highlight>
+                  <a:srgbClr val="C0C0C0"/>
+                </a:highlight>
+              </a:rPr>
+              <a:t>Arya</a:t>
+            </a:r>
+            <a:endParaRPr lang="en-AE" dirty="0"/>
+          </a:p>
+        </p:txBody>
+      </p:sp>
     </p:spTree>
   </p:cSld>
   <p:clrMapOvr>
@@ -10282,6 +10366,46 @@
           </a:graphicData>
         </a:graphic>
       </p:graphicFrame>
+      <p:sp>
+        <p:nvSpPr>
+          <p:cNvPr id="7" name="TextBox 6">
+            <a:extLst>
+              <a:ext uri="{FF2B5EF4-FFF2-40B4-BE49-F238E27FC236}">
+                <a16:creationId xmlns:a16="http://schemas.microsoft.com/office/drawing/2014/main" id="{FBD11FFD-6778-439F-92D2-2B753FF62893}"/>
+              </a:ext>
+            </a:extLst>
+          </p:cNvPr>
+          <p:cNvSpPr txBox="1"/>
+          <p:nvPr/>
+        </p:nvSpPr>
+        <p:spPr>
+          <a:xfrm>
+            <a:off x="3277241" y="134263"/>
+            <a:ext cx="610880" cy="307777"/>
+          </a:xfrm>
+          <a:prstGeom prst="rect">
+            <a:avLst/>
+          </a:prstGeom>
+          <a:noFill/>
+        </p:spPr>
+        <p:txBody>
+          <a:bodyPr wrap="square">
+            <a:spAutoFit/>
+          </a:bodyPr>
+          <a:lstStyle/>
+          <a:p>
+            <a:r>
+              <a:rPr lang="en-US" dirty="0">
+                <a:highlight>
+                  <a:srgbClr val="C0C0C0"/>
+                </a:highlight>
+              </a:rPr>
+              <a:t>Arya</a:t>
+            </a:r>
+            <a:endParaRPr lang="en-AE" dirty="0"/>
+          </a:p>
+        </p:txBody>
+      </p:sp>
     </p:spTree>
   </p:cSld>
   <p:clrMapOvr>

</xml_diff>